<commit_message>
Update Portfolio to PDF
</commit_message>
<xml_diff>
--- a/Portfolio.pptx
+++ b/Portfolio.pptx
@@ -3095,7 +3095,7 @@
           <a:p>
             <a:fld id="{EB0CFB84-6D0E-6C41-ABE8-E5721D777960}" type="datetimeFigureOut">
               <a:rPr lang="en-US" smtClean="0"/>
-              <a:t>9/29/25</a:t>
+              <a:t>10/6/25</a:t>
             </a:fld>
             <a:endParaRPr lang="en-US"/>
           </a:p>
@@ -3677,7 +3677,7 @@
           <a:p>
             <a:fld id="{90A119FF-FA95-CD45-92B5-07740F7CAAA1}" type="datetimeFigureOut">
               <a:rPr lang="en-US" smtClean="0"/>
-              <a:t>9/29/25</a:t>
+              <a:t>10/6/25</a:t>
             </a:fld>
             <a:endParaRPr lang="en-US" dirty="0"/>
           </a:p>
@@ -3916,7 +3916,7 @@
           <a:p>
             <a:fld id="{90A119FF-FA95-CD45-92B5-07740F7CAAA1}" type="datetimeFigureOut">
               <a:rPr lang="en-US" smtClean="0"/>
-              <a:t>9/29/25</a:t>
+              <a:t>10/6/25</a:t>
             </a:fld>
             <a:endParaRPr lang="en-US"/>
           </a:p>
@@ -4165,7 +4165,7 @@
           <a:p>
             <a:fld id="{90A119FF-FA95-CD45-92B5-07740F7CAAA1}" type="datetimeFigureOut">
               <a:rPr lang="en-US" smtClean="0"/>
-              <a:t>9/29/25</a:t>
+              <a:t>10/6/25</a:t>
             </a:fld>
             <a:endParaRPr lang="en-US"/>
           </a:p>
@@ -4404,7 +4404,7 @@
           <a:p>
             <a:fld id="{90A119FF-FA95-CD45-92B5-07740F7CAAA1}" type="datetimeFigureOut">
               <a:rPr lang="en-US" smtClean="0"/>
-              <a:t>9/29/25</a:t>
+              <a:t>10/6/25</a:t>
             </a:fld>
             <a:endParaRPr lang="en-US"/>
           </a:p>
@@ -4720,7 +4720,7 @@
           <a:p>
             <a:fld id="{90A119FF-FA95-CD45-92B5-07740F7CAAA1}" type="datetimeFigureOut">
               <a:rPr lang="en-US" smtClean="0"/>
-              <a:t>9/29/25</a:t>
+              <a:t>10/6/25</a:t>
             </a:fld>
             <a:endParaRPr lang="en-US"/>
           </a:p>
@@ -5026,7 +5026,7 @@
           <a:p>
             <a:fld id="{90A119FF-FA95-CD45-92B5-07740F7CAAA1}" type="datetimeFigureOut">
               <a:rPr lang="en-US" smtClean="0"/>
-              <a:t>9/29/25</a:t>
+              <a:t>10/6/25</a:t>
             </a:fld>
             <a:endParaRPr lang="en-US"/>
           </a:p>
@@ -5479,7 +5479,7 @@
           <a:p>
             <a:fld id="{90A119FF-FA95-CD45-92B5-07740F7CAAA1}" type="datetimeFigureOut">
               <a:rPr lang="en-US" smtClean="0"/>
-              <a:t>9/29/25</a:t>
+              <a:t>10/6/25</a:t>
             </a:fld>
             <a:endParaRPr lang="en-US"/>
           </a:p>
@@ -5661,7 +5661,7 @@
           <a:p>
             <a:fld id="{90A119FF-FA95-CD45-92B5-07740F7CAAA1}" type="datetimeFigureOut">
               <a:rPr lang="en-US" smtClean="0"/>
-              <a:t>9/29/25</a:t>
+              <a:t>10/6/25</a:t>
             </a:fld>
             <a:endParaRPr lang="en-US"/>
           </a:p>
@@ -5815,7 +5815,7 @@
           <a:p>
             <a:fld id="{90A119FF-FA95-CD45-92B5-07740F7CAAA1}" type="datetimeFigureOut">
               <a:rPr lang="en-US" smtClean="0"/>
-              <a:t>9/29/25</a:t>
+              <a:t>10/6/25</a:t>
             </a:fld>
             <a:endParaRPr lang="en-US"/>
           </a:p>
@@ -6167,7 +6167,7 @@
           <a:p>
             <a:fld id="{90A119FF-FA95-CD45-92B5-07740F7CAAA1}" type="datetimeFigureOut">
               <a:rPr lang="en-US" smtClean="0"/>
-              <a:t>9/29/25</a:t>
+              <a:t>10/6/25</a:t>
             </a:fld>
             <a:endParaRPr lang="en-US"/>
           </a:p>
@@ -6496,7 +6496,7 @@
           <a:p>
             <a:fld id="{90A119FF-FA95-CD45-92B5-07740F7CAAA1}" type="datetimeFigureOut">
               <a:rPr lang="en-US" smtClean="0"/>
-              <a:t>9/29/25</a:t>
+              <a:t>10/6/25</a:t>
             </a:fld>
             <a:endParaRPr lang="en-US"/>
           </a:p>
@@ -6783,7 +6783,7 @@
           <a:p>
             <a:fld id="{90A119FF-FA95-CD45-92B5-07740F7CAAA1}" type="datetimeFigureOut">
               <a:rPr lang="en-US" smtClean="0"/>
-              <a:t>9/29/25</a:t>
+              <a:t>10/6/25</a:t>
             </a:fld>
             <a:endParaRPr lang="en-US"/>
           </a:p>
@@ -7611,10 +7611,9 @@
           <a:lstStyle/>
           <a:p>
             <a:r>
-              <a:rPr lang="en-US" dirty="0" err="1"/>
-              <a:t>Portofolio</a:t>
-            </a:r>
-            <a:endParaRPr lang="en-US" dirty="0"/>
+              <a:rPr lang="en-US" dirty="0"/>
+              <a:t>Portfolio</a:t>
+            </a:r>
           </a:p>
         </p:txBody>
       </p:sp>
@@ -12252,8 +12251,19 @@
                 <a:latin typeface="Gill Sans Light" panose="020B0302020104020203" pitchFamily="34" charset="-79"/>
                 <a:cs typeface="Gill Sans Light" panose="020B0302020104020203" pitchFamily="34" charset="-79"/>
               </a:rPr>
-              <a:t>+6282311117335</a:t>
-            </a:r>
+              <a:t>+6282311117335 (</a:t>
+            </a:r>
+            <a:r>
+              <a:rPr lang="en-US" sz="2000" dirty="0" err="1">
+                <a:latin typeface="Gill Sans Light" panose="020B0302020104020203" pitchFamily="34" charset="-79"/>
+                <a:cs typeface="Gill Sans Light" panose="020B0302020104020203" pitchFamily="34" charset="-79"/>
+              </a:rPr>
+              <a:t>Whatsapp</a:t>
+            </a:r>
+            <a:endParaRPr lang="en-US" sz="2000" dirty="0">
+              <a:latin typeface="Gill Sans Light" panose="020B0302020104020203" pitchFamily="34" charset="-79"/>
+              <a:cs typeface="Gill Sans Light" panose="020B0302020104020203" pitchFamily="34" charset="-79"/>
+            </a:endParaRPr>
           </a:p>
           <a:p>
             <a:pPr>
@@ -12782,7 +12792,21 @@
                 <a:latin typeface="Gill Sans Light" panose="020B0302020104020203" pitchFamily="34" charset="-79"/>
                 <a:cs typeface="Gill Sans Light" panose="020B0302020104020203" pitchFamily="34" charset="-79"/>
               </a:rPr>
-              <a:t>+6282311117335</a:t>
+              <a:t>+6282311117335 (</a:t>
+            </a:r>
+            <a:r>
+              <a:rPr lang="en-US" sz="1400" dirty="0" err="1">
+                <a:latin typeface="Gill Sans Light" panose="020B0302020104020203" pitchFamily="34" charset="-79"/>
+                <a:cs typeface="Gill Sans Light" panose="020B0302020104020203" pitchFamily="34" charset="-79"/>
+              </a:rPr>
+              <a:t>Whatsapp</a:t>
+            </a:r>
+            <a:r>
+              <a:rPr lang="en-US" sz="1400" dirty="0">
+                <a:latin typeface="Gill Sans Light" panose="020B0302020104020203" pitchFamily="34" charset="-79"/>
+                <a:cs typeface="Gill Sans Light" panose="020B0302020104020203" pitchFamily="34" charset="-79"/>
+              </a:rPr>
+              <a:t>)</a:t>
             </a:r>
           </a:p>
           <a:p>
@@ -13027,7 +13051,7 @@
         <p:spPr>
           <a:xfrm>
             <a:off x="5846210" y="2120802"/>
-            <a:ext cx="5211965" cy="1026243"/>
+            <a:ext cx="5739238" cy="1026243"/>
           </a:xfrm>
           <a:prstGeom prst="rect">
             <a:avLst/>
@@ -13064,7 +13088,7 @@
                 <a:latin typeface="Gill Sans Light" panose="020B0302020104020203" pitchFamily="34" charset="-79"/>
                 <a:cs typeface="Gill Sans Light" panose="020B0302020104020203" pitchFamily="34" charset="-79"/>
               </a:rPr>
-              <a:t> University 2023</a:t>
+              <a:t> University Nov 2023</a:t>
             </a:r>
           </a:p>
           <a:p>
@@ -13092,7 +13116,7 @@
                 <a:latin typeface="Gill Sans Light" panose="020B0302020104020203" pitchFamily="34" charset="-79"/>
                 <a:cs typeface="Gill Sans Light" panose="020B0302020104020203" pitchFamily="34" charset="-79"/>
               </a:rPr>
-              <a:t> University 2026(Expected)</a:t>
+              <a:t> University March 2026(Expected)</a:t>
             </a:r>
           </a:p>
           <a:p>
@@ -13120,7 +13144,7 @@
                 <a:latin typeface="Gill Sans Light" panose="020B0302020104020203" pitchFamily="34" charset="-79"/>
                 <a:cs typeface="Gill Sans Light" panose="020B0302020104020203" pitchFamily="34" charset="-79"/>
               </a:rPr>
-              <a:t> University 2026(Expected)</a:t>
+              <a:t> University March 2026(Expected)</a:t>
             </a:r>
           </a:p>
         </p:txBody>
@@ -14693,7 +14717,7 @@
                 <a:latin typeface="Gill Sans Light" panose="020B0302020104020203" pitchFamily="34" charset="-79"/>
                 <a:cs typeface="Gill Sans Light" panose="020B0302020104020203" pitchFamily="34" charset="-79"/>
               </a:rPr>
-              <a:t>Mainly teach python for Senior High School.</a:t>
+              <a:t>Mainly teach python for Senior High School and private class using Bahasa Indonesia and English as medium of interaction.</a:t>
             </a:r>
           </a:p>
           <a:p>

</xml_diff>